<commit_message>
Adding Prod Support PPT
</commit_message>
<xml_diff>
--- a/Prod Support/EmpowHer - Production Support.pptx
+++ b/Prod Support/EmpowHer - Production Support.pptx
@@ -10,16 +10,17 @@
     <p:sldId id="258" r:id="rId7"/>
     <p:sldId id="278" r:id="rId8"/>
     <p:sldId id="283" r:id="rId9"/>
-    <p:sldId id="284" r:id="rId10"/>
-    <p:sldId id="286" r:id="rId11"/>
-    <p:sldId id="287" r:id="rId12"/>
-    <p:sldId id="288" r:id="rId13"/>
-    <p:sldId id="285" r:id="rId14"/>
-    <p:sldId id="289" r:id="rId15"/>
-    <p:sldId id="290" r:id="rId16"/>
-    <p:sldId id="291" r:id="rId17"/>
-    <p:sldId id="292" r:id="rId18"/>
-    <p:sldId id="277" r:id="rId19"/>
+    <p:sldId id="293" r:id="rId10"/>
+    <p:sldId id="284" r:id="rId11"/>
+    <p:sldId id="286" r:id="rId12"/>
+    <p:sldId id="287" r:id="rId13"/>
+    <p:sldId id="288" r:id="rId14"/>
+    <p:sldId id="294" r:id="rId15"/>
+    <p:sldId id="295" r:id="rId16"/>
+    <p:sldId id="290" r:id="rId17"/>
+    <p:sldId id="291" r:id="rId18"/>
+    <p:sldId id="292" r:id="rId19"/>
+    <p:sldId id="277" r:id="rId20"/>
   </p:sldIdLst>
   <p:sldSz cx="12192000" cy="6858000"/>
   <p:notesSz cx="6858000" cy="9144000"/>
@@ -128,12 +129,13 @@
             <p14:sldId id="258"/>
             <p14:sldId id="278"/>
             <p14:sldId id="283"/>
+            <p14:sldId id="293"/>
             <p14:sldId id="284"/>
             <p14:sldId id="286"/>
             <p14:sldId id="287"/>
             <p14:sldId id="288"/>
-            <p14:sldId id="285"/>
-            <p14:sldId id="289"/>
+            <p14:sldId id="294"/>
+            <p14:sldId id="295"/>
             <p14:sldId id="290"/>
             <p14:sldId id="291"/>
             <p14:sldId id="292"/>
@@ -746,7 +748,7 @@
           <a:p>
             <a:fld id="{A6EF1A6F-E424-4B9E-A6EF-BD3AD08B8CD1}" type="datetimeFigureOut">
               <a:rPr lang="en-IN" smtClean="0"/>
-              <a:t>29-07-2023</a:t>
+              <a:t>07-08-2023</a:t>
             </a:fld>
             <a:endParaRPr lang="en-IN"/>
           </a:p>
@@ -946,7 +948,7 @@
           <a:p>
             <a:fld id="{A6EF1A6F-E424-4B9E-A6EF-BD3AD08B8CD1}" type="datetimeFigureOut">
               <a:rPr lang="en-IN" smtClean="0"/>
-              <a:t>29-07-2023</a:t>
+              <a:t>07-08-2023</a:t>
             </a:fld>
             <a:endParaRPr lang="en-IN"/>
           </a:p>
@@ -1156,7 +1158,7 @@
           <a:p>
             <a:fld id="{A6EF1A6F-E424-4B9E-A6EF-BD3AD08B8CD1}" type="datetimeFigureOut">
               <a:rPr lang="en-IN" smtClean="0"/>
-              <a:t>29-07-2023</a:t>
+              <a:t>07-08-2023</a:t>
             </a:fld>
             <a:endParaRPr lang="en-IN"/>
           </a:p>
@@ -1356,7 +1358,7 @@
           <a:p>
             <a:fld id="{A6EF1A6F-E424-4B9E-A6EF-BD3AD08B8CD1}" type="datetimeFigureOut">
               <a:rPr lang="en-IN" smtClean="0"/>
-              <a:t>29-07-2023</a:t>
+              <a:t>07-08-2023</a:t>
             </a:fld>
             <a:endParaRPr lang="en-IN"/>
           </a:p>
@@ -1632,7 +1634,7 @@
           <a:p>
             <a:fld id="{A6EF1A6F-E424-4B9E-A6EF-BD3AD08B8CD1}" type="datetimeFigureOut">
               <a:rPr lang="en-IN" smtClean="0"/>
-              <a:t>29-07-2023</a:t>
+              <a:t>07-08-2023</a:t>
             </a:fld>
             <a:endParaRPr lang="en-IN"/>
           </a:p>
@@ -1900,7 +1902,7 @@
           <a:p>
             <a:fld id="{A6EF1A6F-E424-4B9E-A6EF-BD3AD08B8CD1}" type="datetimeFigureOut">
               <a:rPr lang="en-IN" smtClean="0"/>
-              <a:t>29-07-2023</a:t>
+              <a:t>07-08-2023</a:t>
             </a:fld>
             <a:endParaRPr lang="en-IN"/>
           </a:p>
@@ -2315,7 +2317,7 @@
           <a:p>
             <a:fld id="{A6EF1A6F-E424-4B9E-A6EF-BD3AD08B8CD1}" type="datetimeFigureOut">
               <a:rPr lang="en-IN" smtClean="0"/>
-              <a:t>29-07-2023</a:t>
+              <a:t>07-08-2023</a:t>
             </a:fld>
             <a:endParaRPr lang="en-IN"/>
           </a:p>
@@ -2457,7 +2459,7 @@
           <a:p>
             <a:fld id="{A6EF1A6F-E424-4B9E-A6EF-BD3AD08B8CD1}" type="datetimeFigureOut">
               <a:rPr lang="en-IN" smtClean="0"/>
-              <a:t>29-07-2023</a:t>
+              <a:t>07-08-2023</a:t>
             </a:fld>
             <a:endParaRPr lang="en-IN"/>
           </a:p>
@@ -2570,7 +2572,7 @@
           <a:p>
             <a:fld id="{A6EF1A6F-E424-4B9E-A6EF-BD3AD08B8CD1}" type="datetimeFigureOut">
               <a:rPr lang="en-IN" smtClean="0"/>
-              <a:t>29-07-2023</a:t>
+              <a:t>07-08-2023</a:t>
             </a:fld>
             <a:endParaRPr lang="en-IN"/>
           </a:p>
@@ -2883,7 +2885,7 @@
           <a:p>
             <a:fld id="{A6EF1A6F-E424-4B9E-A6EF-BD3AD08B8CD1}" type="datetimeFigureOut">
               <a:rPr lang="en-IN" smtClean="0"/>
-              <a:t>29-07-2023</a:t>
+              <a:t>07-08-2023</a:t>
             </a:fld>
             <a:endParaRPr lang="en-IN"/>
           </a:p>
@@ -3172,7 +3174,7 @@
           <a:p>
             <a:fld id="{A6EF1A6F-E424-4B9E-A6EF-BD3AD08B8CD1}" type="datetimeFigureOut">
               <a:rPr lang="en-IN" smtClean="0"/>
-              <a:t>29-07-2023</a:t>
+              <a:t>07-08-2023</a:t>
             </a:fld>
             <a:endParaRPr lang="en-IN"/>
           </a:p>
@@ -3415,7 +3417,7 @@
           <a:p>
             <a:fld id="{A6EF1A6F-E424-4B9E-A6EF-BD3AD08B8CD1}" type="datetimeFigureOut">
               <a:rPr lang="en-IN" smtClean="0"/>
-              <a:t>29-07-2023</a:t>
+              <a:t>07-08-2023</a:t>
             </a:fld>
             <a:endParaRPr lang="en-IN"/>
           </a:p>
@@ -3949,7 +3951,7 @@
           <p:cNvPr id="2" name="Title 1">
             <a:extLst>
               <a:ext uri="{FF2B5EF4-FFF2-40B4-BE49-F238E27FC236}">
-                <a16:creationId xmlns:a16="http://schemas.microsoft.com/office/drawing/2014/main" id="{DA40E4CB-0838-8D4A-C960-F462A73574A5}"/>
+                <a16:creationId xmlns:a16="http://schemas.microsoft.com/office/drawing/2014/main" id="{EAEF8827-3A58-7F11-C92E-920742482E2D}"/>
               </a:ext>
             </a:extLst>
           </p:cNvPr>
@@ -3968,12 +3970,9 @@
           <a:lstStyle/>
           <a:p>
             <a:r>
-              <a:rPr lang="en-IN" sz="3200" b="1" u="sng" dirty="0"/>
-              <a:t>Problem Management</a:t>
-            </a:r>
-            <a:br>
               <a:rPr lang="en-US" sz="3200" b="1" u="sng" dirty="0"/>
-            </a:br>
+              <a:t>PRODUCTION SUPPORT TEAM ENGAGEMENTS:</a:t>
+            </a:r>
             <a:endParaRPr lang="en-IN" sz="3200" b="1" u="sng" dirty="0"/>
           </a:p>
         </p:txBody>
@@ -3983,7 +3982,7 @@
           <p:cNvPr id="3" name="Content Placeholder 2">
             <a:extLst>
               <a:ext uri="{FF2B5EF4-FFF2-40B4-BE49-F238E27FC236}">
-                <a16:creationId xmlns:a16="http://schemas.microsoft.com/office/drawing/2014/main" id="{F481D376-B236-E2B4-323B-1B582CFC9B78}"/>
+                <a16:creationId xmlns:a16="http://schemas.microsoft.com/office/drawing/2014/main" id="{2F219EE1-2E90-C7F7-0FA4-8311F3021E3C}"/>
               </a:ext>
             </a:extLst>
           </p:cNvPr>
@@ -3996,8 +3995,8 @@
         </p:nvSpPr>
         <p:spPr>
           <a:xfrm>
-            <a:off x="838200" y="1342239"/>
-            <a:ext cx="10515600" cy="4834724"/>
+            <a:off x="92364" y="1526796"/>
+            <a:ext cx="11261436" cy="4966079"/>
           </a:xfrm>
         </p:spPr>
         <p:txBody>
@@ -4006,40 +4005,13 @@
           </a:bodyPr>
           <a:lstStyle/>
           <a:p>
-            <a:pPr marL="0" indent="0">
-              <a:buNone/>
-            </a:pPr>
-            <a:r>
-              <a:rPr lang="en-US" sz="1800" b="0" i="0" dirty="0">
-                <a:solidFill>
-                  <a:srgbClr val="091E42"/>
-                </a:solidFill>
-                <a:effectLst/>
-                <a:latin typeface="Charlie Text"/>
-              </a:rPr>
-              <a:t>Problem management is the process of identifying and managing the causes of incidents on an IT service.</a:t>
-            </a:r>
-          </a:p>
-          <a:p>
-            <a:pPr marL="0" indent="0">
-              <a:buNone/>
-            </a:pPr>
-            <a:r>
-              <a:rPr lang="en-US" sz="1800" dirty="0"/>
-              <a:t>Problem management isn’t just about finding and fixing incidents but identifying and understanding the underlying causes of an incident as well as identifying the best method to eliminate that root cause.</a:t>
-            </a:r>
-          </a:p>
-          <a:p>
-            <a:pPr marL="0" indent="0">
-              <a:buNone/>
-            </a:pPr>
-            <a:endParaRPr lang="en-US" sz="1800" dirty="0"/>
-          </a:p>
-          <a:p>
-            <a:pPr marL="0" indent="0">
-              <a:buNone/>
-            </a:pPr>
-            <a:endParaRPr lang="en-IN" sz="1800" dirty="0"/>
+            <a:r>
+              <a:rPr lang="en-US" dirty="0"/>
+              <a:t>Creating Dashboards:</a:t>
+            </a:r>
+          </a:p>
+          <a:p>
+            <a:endParaRPr lang="en-IN" dirty="0"/>
           </a:p>
         </p:txBody>
       </p:sp>
@@ -4048,7 +4020,7 @@
           <p:cNvPr id="5" name="Picture 4">
             <a:extLst>
               <a:ext uri="{FF2B5EF4-FFF2-40B4-BE49-F238E27FC236}">
-                <a16:creationId xmlns:a16="http://schemas.microsoft.com/office/drawing/2014/main" id="{00B7B6DD-3E9F-AF84-E187-C05364C33180}"/>
+                <a16:creationId xmlns:a16="http://schemas.microsoft.com/office/drawing/2014/main" id="{417D500E-AD2D-4117-35FB-FA38931A16DA}"/>
               </a:ext>
             </a:extLst>
           </p:cNvPr>
@@ -4065,8 +4037,38 @@
         </p:blipFill>
         <p:spPr>
           <a:xfrm>
-            <a:off x="2100569" y="2667802"/>
-            <a:ext cx="7353300" cy="3648075"/>
+            <a:off x="203201" y="2149722"/>
+            <a:ext cx="5892800" cy="4219575"/>
+          </a:xfrm>
+          <a:prstGeom prst="rect">
+            <a:avLst/>
+          </a:prstGeom>
+        </p:spPr>
+      </p:pic>
+      <p:pic>
+        <p:nvPicPr>
+          <p:cNvPr id="9" name="Picture 8">
+            <a:extLst>
+              <a:ext uri="{FF2B5EF4-FFF2-40B4-BE49-F238E27FC236}">
+                <a16:creationId xmlns:a16="http://schemas.microsoft.com/office/drawing/2014/main" id="{80076936-1C62-A1FC-314A-E3ED78DA49F3}"/>
+              </a:ext>
+            </a:extLst>
+          </p:cNvPr>
+          <p:cNvPicPr>
+            <a:picLocks noChangeAspect="1"/>
+          </p:cNvPicPr>
+          <p:nvPr/>
+        </p:nvPicPr>
+        <p:blipFill>
+          <a:blip r:embed="rId3"/>
+          <a:stretch>
+            <a:fillRect/>
+          </a:stretch>
+        </p:blipFill>
+        <p:spPr>
+          <a:xfrm>
+            <a:off x="6520873" y="2149722"/>
+            <a:ext cx="5671126" cy="4219575"/>
           </a:xfrm>
           <a:prstGeom prst="rect">
             <a:avLst/>
@@ -4076,7 +4078,7 @@
     </p:spTree>
     <p:extLst>
       <p:ext uri="{BB962C8B-B14F-4D97-AF65-F5344CB8AC3E}">
-        <p14:creationId xmlns:p14="http://schemas.microsoft.com/office/powerpoint/2010/main" val="3851177491"/>
+        <p14:creationId xmlns:p14="http://schemas.microsoft.com/office/powerpoint/2010/main" val="965706284"/>
       </p:ext>
     </p:extLst>
   </p:cSld>
@@ -4108,7 +4110,7 @@
           <p:cNvPr id="2" name="Title 1">
             <a:extLst>
               <a:ext uri="{FF2B5EF4-FFF2-40B4-BE49-F238E27FC236}">
-                <a16:creationId xmlns:a16="http://schemas.microsoft.com/office/drawing/2014/main" id="{949E049A-4B8A-96E4-AFC5-495CA0D93772}"/>
+                <a16:creationId xmlns:a16="http://schemas.microsoft.com/office/drawing/2014/main" id="{EAEF8827-3A58-7F11-C92E-920742482E2D}"/>
               </a:ext>
             </a:extLst>
           </p:cNvPr>
@@ -4119,25 +4121,17 @@
             <p:ph type="title"/>
           </p:nvPr>
         </p:nvSpPr>
-        <p:spPr>
-          <a:xfrm>
-            <a:off x="838200" y="365126"/>
-            <a:ext cx="10515600" cy="521566"/>
-          </a:xfrm>
-        </p:spPr>
+        <p:spPr/>
         <p:txBody>
           <a:bodyPr>
-            <a:normAutofit fontScale="90000"/>
+            <a:normAutofit/>
           </a:bodyPr>
           <a:lstStyle/>
           <a:p>
             <a:r>
-              <a:rPr lang="en-IN" sz="3200" b="1" u="sng" dirty="0"/>
-              <a:t>Change Management</a:t>
-            </a:r>
-            <a:br>
-              <a:rPr lang="en-US" sz="3200" b="1" u="sng" dirty="0"/>
-            </a:br>
+              <a:rPr lang="en-US" sz="3200" b="1" u="sng"/>
+              <a:t>PRODUCTION SUPPORT TEAM ENGAGEMENTS: (contd)..</a:t>
+            </a:r>
             <a:endParaRPr lang="en-IN" sz="3200" b="1" u="sng" dirty="0"/>
           </a:p>
         </p:txBody>
@@ -4147,7 +4141,7 @@
           <p:cNvPr id="3" name="Content Placeholder 2">
             <a:extLst>
               <a:ext uri="{FF2B5EF4-FFF2-40B4-BE49-F238E27FC236}">
-                <a16:creationId xmlns:a16="http://schemas.microsoft.com/office/drawing/2014/main" id="{42E7728D-ECA5-B66B-0ECD-FE4503537812}"/>
+                <a16:creationId xmlns:a16="http://schemas.microsoft.com/office/drawing/2014/main" id="{2F219EE1-2E90-C7F7-0FA4-8311F3021E3C}"/>
               </a:ext>
             </a:extLst>
           </p:cNvPr>
@@ -4160,8 +4154,8 @@
         </p:nvSpPr>
         <p:spPr>
           <a:xfrm>
-            <a:off x="838200" y="886692"/>
-            <a:ext cx="10515600" cy="5290271"/>
+            <a:off x="0" y="1526796"/>
+            <a:ext cx="11353800" cy="4966079"/>
           </a:xfrm>
         </p:spPr>
         <p:txBody>
@@ -4170,35 +4164,22 @@
           </a:bodyPr>
           <a:lstStyle/>
           <a:p>
-            <a:pPr algn="just"/>
-            <a:r>
-              <a:rPr lang="en-US" sz="1800" dirty="0"/>
-              <a:t>Change management is the process of guiding organizational change from start to finish, including planning, implementing, and solidifying changes in an organization. </a:t>
-            </a:r>
-          </a:p>
-          <a:p>
-            <a:pPr algn="just"/>
-            <a:r>
-              <a:rPr lang="en-US" sz="1800" dirty="0"/>
-              <a:t>It refers to how companies handle modifications, such as the implementation of new technology, adjustments to existing processes, and shifting organizational hierarchy. </a:t>
-            </a:r>
-          </a:p>
-          <a:p>
-            <a:pPr algn="just"/>
-            <a:r>
-              <a:rPr lang="en-US" sz="1800" dirty="0"/>
-              <a:t>This process can look different based on the type of change you are conducting.</a:t>
-            </a:r>
-            <a:endParaRPr lang="en-IN" sz="1800" dirty="0"/>
+            <a:r>
+              <a:rPr lang="en-US" sz="2000" dirty="0"/>
+              <a:t>Working with alerts and creating dashboards through various monitoring tools like Splunk, AppDynamics. etc.</a:t>
+            </a:r>
+          </a:p>
+          <a:p>
+            <a:endParaRPr lang="en-IN" dirty="0"/>
           </a:p>
         </p:txBody>
       </p:sp>
       <p:pic>
         <p:nvPicPr>
-          <p:cNvPr id="5" name="Picture 4">
+          <p:cNvPr id="6" name="Picture 5">
             <a:extLst>
               <a:ext uri="{FF2B5EF4-FFF2-40B4-BE49-F238E27FC236}">
-                <a16:creationId xmlns:a16="http://schemas.microsoft.com/office/drawing/2014/main" id="{1D5DB158-E15A-3808-2261-CE59F1C63E45}"/>
+                <a16:creationId xmlns:a16="http://schemas.microsoft.com/office/drawing/2014/main" id="{0D2C5C41-22BE-E300-ED9A-66947325C93D}"/>
               </a:ext>
             </a:extLst>
           </p:cNvPr>
@@ -4215,8 +4196,38 @@
         </p:blipFill>
         <p:spPr>
           <a:xfrm>
-            <a:off x="2761673" y="2572469"/>
-            <a:ext cx="6216071" cy="4126059"/>
+            <a:off x="86159" y="2328194"/>
+            <a:ext cx="5806225" cy="3620943"/>
+          </a:xfrm>
+          <a:prstGeom prst="rect">
+            <a:avLst/>
+          </a:prstGeom>
+        </p:spPr>
+      </p:pic>
+      <p:pic>
+        <p:nvPicPr>
+          <p:cNvPr id="8" name="Picture 7">
+            <a:extLst>
+              <a:ext uri="{FF2B5EF4-FFF2-40B4-BE49-F238E27FC236}">
+                <a16:creationId xmlns:a16="http://schemas.microsoft.com/office/drawing/2014/main" id="{A9C60A96-F578-929A-45A3-49663CEF9E39}"/>
+              </a:ext>
+            </a:extLst>
+          </p:cNvPr>
+          <p:cNvPicPr>
+            <a:picLocks noChangeAspect="1"/>
+          </p:cNvPicPr>
+          <p:nvPr/>
+        </p:nvPicPr>
+        <p:blipFill>
+          <a:blip r:embed="rId3"/>
+          <a:stretch>
+            <a:fillRect/>
+          </a:stretch>
+        </p:blipFill>
+        <p:spPr>
+          <a:xfrm>
+            <a:off x="6096000" y="2328194"/>
+            <a:ext cx="6009841" cy="3363281"/>
           </a:xfrm>
           <a:prstGeom prst="rect">
             <a:avLst/>
@@ -4226,7 +4237,7 @@
     </p:spTree>
     <p:extLst>
       <p:ext uri="{BB962C8B-B14F-4D97-AF65-F5344CB8AC3E}">
-        <p14:creationId xmlns:p14="http://schemas.microsoft.com/office/powerpoint/2010/main" val="2376325886"/>
+        <p14:creationId xmlns:p14="http://schemas.microsoft.com/office/powerpoint/2010/main" val="628591155"/>
       </p:ext>
     </p:extLst>
   </p:cSld>
@@ -4258,6 +4269,242 @@
           <p:cNvPr id="2" name="Title 1">
             <a:extLst>
               <a:ext uri="{FF2B5EF4-FFF2-40B4-BE49-F238E27FC236}">
+                <a16:creationId xmlns:a16="http://schemas.microsoft.com/office/drawing/2014/main" id="{EAEF8827-3A58-7F11-C92E-920742482E2D}"/>
+              </a:ext>
+            </a:extLst>
+          </p:cNvPr>
+          <p:cNvSpPr>
+            <a:spLocks noGrp="1"/>
+          </p:cNvSpPr>
+          <p:nvPr>
+            <p:ph type="title"/>
+          </p:nvPr>
+        </p:nvSpPr>
+        <p:spPr/>
+        <p:txBody>
+          <a:bodyPr>
+            <a:normAutofit/>
+          </a:bodyPr>
+          <a:lstStyle/>
+          <a:p>
+            <a:r>
+              <a:rPr lang="en-US" sz="3200" b="1" u="sng" dirty="0"/>
+              <a:t>PRODUCTION SUPPORT TEAM ENGAGEMENTS: (</a:t>
+            </a:r>
+            <a:r>
+              <a:rPr lang="en-US" sz="3200" b="1" u="sng" dirty="0" err="1"/>
+              <a:t>contd</a:t>
+            </a:r>
+            <a:r>
+              <a:rPr lang="en-US" sz="3200" b="1" u="sng" dirty="0"/>
+              <a:t>)..</a:t>
+            </a:r>
+            <a:endParaRPr lang="en-IN" sz="3200" b="1" u="sng" dirty="0"/>
+          </a:p>
+        </p:txBody>
+      </p:sp>
+      <p:sp>
+        <p:nvSpPr>
+          <p:cNvPr id="3" name="Content Placeholder 2">
+            <a:extLst>
+              <a:ext uri="{FF2B5EF4-FFF2-40B4-BE49-F238E27FC236}">
+                <a16:creationId xmlns:a16="http://schemas.microsoft.com/office/drawing/2014/main" id="{2F219EE1-2E90-C7F7-0FA4-8311F3021E3C}"/>
+              </a:ext>
+            </a:extLst>
+          </p:cNvPr>
+          <p:cNvSpPr>
+            <a:spLocks noGrp="1"/>
+          </p:cNvSpPr>
+          <p:nvPr>
+            <p:ph idx="1"/>
+          </p:nvPr>
+        </p:nvSpPr>
+        <p:spPr>
+          <a:xfrm>
+            <a:off x="578840" y="1526796"/>
+            <a:ext cx="10774960" cy="4966079"/>
+          </a:xfrm>
+        </p:spPr>
+        <p:txBody>
+          <a:bodyPr>
+            <a:normAutofit/>
+          </a:bodyPr>
+          <a:lstStyle/>
+          <a:p>
+            <a:r>
+              <a:rPr lang="en-US" sz="2000" dirty="0"/>
+              <a:t>Production Support team also helps an organization with automation ideas and creates automation for various mundane works or repetitive works. Like the following works the team supports:</a:t>
+            </a:r>
+          </a:p>
+          <a:p>
+            <a:pPr marL="0" indent="0">
+              <a:buNone/>
+            </a:pPr>
+            <a:endParaRPr lang="en-US" sz="2000" dirty="0"/>
+          </a:p>
+          <a:p>
+            <a:pPr rtl="0">
+              <a:buFont typeface="+mj-lt"/>
+              <a:buAutoNum type="arabicPeriod"/>
+            </a:pPr>
+            <a:r>
+              <a:rPr lang="en-US" sz="1400" b="1" dirty="0"/>
+              <a:t>Incident Automation.</a:t>
+            </a:r>
+            <a:endParaRPr lang="en-US" sz="1400" dirty="0"/>
+          </a:p>
+          <a:p>
+            <a:pPr rtl="0">
+              <a:buFont typeface="+mj-lt"/>
+              <a:buAutoNum type="arabicPeriod"/>
+            </a:pPr>
+            <a:r>
+              <a:rPr lang="en-US" sz="1400" b="1" dirty="0"/>
+              <a:t>Routine Tasks Automation.</a:t>
+            </a:r>
+            <a:endParaRPr lang="en-US" sz="1400" dirty="0"/>
+          </a:p>
+          <a:p>
+            <a:pPr rtl="0">
+              <a:buFont typeface="+mj-lt"/>
+              <a:buAutoNum type="arabicPeriod"/>
+            </a:pPr>
+            <a:r>
+              <a:rPr lang="en-US" sz="1400" b="1" dirty="0"/>
+              <a:t>Deployment Automation.</a:t>
+            </a:r>
+            <a:endParaRPr lang="en-US" sz="1400" dirty="0"/>
+          </a:p>
+          <a:p>
+            <a:pPr rtl="0">
+              <a:buFont typeface="+mj-lt"/>
+              <a:buAutoNum type="arabicPeriod"/>
+            </a:pPr>
+            <a:r>
+              <a:rPr lang="en-US" sz="1400" b="1" dirty="0"/>
+              <a:t>Auto-Healing Mechanisms.</a:t>
+            </a:r>
+          </a:p>
+          <a:p>
+            <a:pPr rtl="0">
+              <a:buFont typeface="+mj-lt"/>
+              <a:buAutoNum type="arabicPeriod"/>
+            </a:pPr>
+            <a:r>
+              <a:rPr lang="en-US" sz="1400" b="1" dirty="0"/>
+              <a:t>Automated Alerts and Notifications.</a:t>
+            </a:r>
+            <a:endParaRPr lang="en-US" sz="1400" dirty="0"/>
+          </a:p>
+          <a:p>
+            <a:pPr rtl="0">
+              <a:buFont typeface="+mj-lt"/>
+              <a:buAutoNum type="arabicPeriod"/>
+            </a:pPr>
+            <a:r>
+              <a:rPr lang="en-US" sz="1400" b="1" dirty="0"/>
+              <a:t>Automated Documentation.</a:t>
+            </a:r>
+            <a:endParaRPr lang="en-US" sz="1400" dirty="0"/>
+          </a:p>
+          <a:p>
+            <a:pPr rtl="0">
+              <a:buFont typeface="+mj-lt"/>
+              <a:buAutoNum type="arabicPeriod"/>
+            </a:pPr>
+            <a:r>
+              <a:rPr lang="en-US" sz="1400" b="1" dirty="0"/>
+              <a:t>Scripting and Coding.</a:t>
+            </a:r>
+            <a:endParaRPr lang="en-US" sz="2000" dirty="0"/>
+          </a:p>
+          <a:p>
+            <a:endParaRPr lang="en-IN" dirty="0"/>
+          </a:p>
+        </p:txBody>
+      </p:sp>
+      <p:pic>
+        <p:nvPicPr>
+          <p:cNvPr id="1026" name="Picture 2" descr="What is Automation and Why Does Your Company Need It? - Global Trade  Magazine">
+            <a:extLst>
+              <a:ext uri="{FF2B5EF4-FFF2-40B4-BE49-F238E27FC236}">
+                <a16:creationId xmlns:a16="http://schemas.microsoft.com/office/drawing/2014/main" id="{8EF804AA-5F49-F167-270F-35E8C2161C73}"/>
+              </a:ext>
+            </a:extLst>
+          </p:cNvPr>
+          <p:cNvPicPr>
+            <a:picLocks noChangeAspect="1" noChangeArrowheads="1"/>
+          </p:cNvPicPr>
+          <p:nvPr/>
+        </p:nvPicPr>
+        <p:blipFill>
+          <a:blip r:embed="rId2">
+            <a:extLst>
+              <a:ext uri="{28A0092B-C50C-407E-A947-70E740481C1C}">
+                <a14:useLocalDpi xmlns:a14="http://schemas.microsoft.com/office/drawing/2010/main" val="0"/>
+              </a:ext>
+            </a:extLst>
+          </a:blip>
+          <a:srcRect/>
+          <a:stretch>
+            <a:fillRect/>
+          </a:stretch>
+        </p:blipFill>
+        <p:spPr bwMode="auto">
+          <a:xfrm>
+            <a:off x="4572395" y="2354291"/>
+            <a:ext cx="7309723" cy="2976913"/>
+          </a:xfrm>
+          <a:prstGeom prst="rect">
+            <a:avLst/>
+          </a:prstGeom>
+          <a:noFill/>
+          <a:extLst>
+            <a:ext uri="{909E8E84-426E-40DD-AFC4-6F175D3DCCD1}">
+              <a14:hiddenFill xmlns:a14="http://schemas.microsoft.com/office/drawing/2010/main">
+                <a:solidFill>
+                  <a:srgbClr val="FFFFFF"/>
+                </a:solidFill>
+              </a14:hiddenFill>
+            </a:ext>
+          </a:extLst>
+        </p:spPr>
+      </p:pic>
+    </p:spTree>
+    <p:extLst>
+      <p:ext uri="{BB962C8B-B14F-4D97-AF65-F5344CB8AC3E}">
+        <p14:creationId xmlns:p14="http://schemas.microsoft.com/office/powerpoint/2010/main" val="3189213058"/>
+      </p:ext>
+    </p:extLst>
+  </p:cSld>
+  <p:clrMapOvr>
+    <a:masterClrMapping/>
+  </p:clrMapOvr>
+</p:sld>
+</file>
+
+<file path=ppt/slides/slide13.xml><?xml version="1.0" encoding="utf-8"?>
+<p:sld xmlns:a="http://schemas.openxmlformats.org/drawingml/2006/main" xmlns:r="http://schemas.openxmlformats.org/officeDocument/2006/relationships" xmlns:p="http://schemas.openxmlformats.org/presentationml/2006/main">
+  <p:cSld>
+    <p:spTree>
+      <p:nvGrpSpPr>
+        <p:cNvPr id="1" name=""/>
+        <p:cNvGrpSpPr/>
+        <p:nvPr/>
+      </p:nvGrpSpPr>
+      <p:grpSpPr>
+        <a:xfrm>
+          <a:off x="0" y="0"/>
+          <a:ext cx="0" cy="0"/>
+          <a:chOff x="0" y="0"/>
+          <a:chExt cx="0" cy="0"/>
+        </a:xfrm>
+      </p:grpSpPr>
+      <p:sp>
+        <p:nvSpPr>
+          <p:cNvPr id="2" name="Title 1">
+            <a:extLst>
+              <a:ext uri="{FF2B5EF4-FFF2-40B4-BE49-F238E27FC236}">
                 <a16:creationId xmlns:a16="http://schemas.microsoft.com/office/drawing/2014/main" id="{D11DE0C1-A4C6-0242-FF60-10D0E61A451F}"/>
               </a:ext>
             </a:extLst>
@@ -4630,7 +4877,7 @@
 </p:sld>
 </file>
 
-<file path=ppt/slides/slide13.xml><?xml version="1.0" encoding="utf-8"?>
+<file path=ppt/slides/slide14.xml><?xml version="1.0" encoding="utf-8"?>
 <p:sld xmlns:a="http://schemas.openxmlformats.org/drawingml/2006/main" xmlns:r="http://schemas.openxmlformats.org/officeDocument/2006/relationships" xmlns:p="http://schemas.openxmlformats.org/presentationml/2006/main">
   <p:cSld>
     <p:spTree>
@@ -4741,7 +4988,7 @@
 </p:sld>
 </file>
 
-<file path=ppt/slides/slide14.xml><?xml version="1.0" encoding="utf-8"?>
+<file path=ppt/slides/slide15.xml><?xml version="1.0" encoding="utf-8"?>
 <p:sld xmlns:a="http://schemas.openxmlformats.org/drawingml/2006/main" xmlns:r="http://schemas.openxmlformats.org/officeDocument/2006/relationships" xmlns:p="http://schemas.openxmlformats.org/presentationml/2006/main">
   <p:cSld>
     <p:bg>
@@ -5393,7 +5640,7 @@
 </p:sld>
 </file>
 
-<file path=ppt/slides/slide15.xml><?xml version="1.0" encoding="utf-8"?>
+<file path=ppt/slides/slide16.xml><?xml version="1.0" encoding="utf-8"?>
 <p:sld xmlns:a="http://schemas.openxmlformats.org/drawingml/2006/main" xmlns:r="http://schemas.openxmlformats.org/officeDocument/2006/relationships" xmlns:p="http://schemas.openxmlformats.org/presentationml/2006/main">
   <p:cSld>
     <p:spTree>
@@ -5570,7 +5817,7 @@
         <p:spPr/>
         <p:txBody>
           <a:bodyPr>
-            <a:normAutofit fontScale="92500" lnSpcReduction="20000"/>
+            <a:normAutofit lnSpcReduction="10000"/>
           </a:bodyPr>
           <a:lstStyle/>
           <a:p>
@@ -5601,7 +5848,7 @@
             </a:pPr>
             <a:r>
               <a:rPr lang="en-US" dirty="0"/>
-              <a:t>Role of the Production Support Team</a:t>
+              <a:t>Roles &amp; Responsibilities of the Production Support Team</a:t>
             </a:r>
           </a:p>
           <a:p>
@@ -5611,7 +5858,7 @@
             </a:pPr>
             <a:r>
               <a:rPr lang="en-US" dirty="0"/>
-              <a:t>Key Responsibilities of the Production Support Team</a:t>
+              <a:t>Aps Team -&gt; Additional Activities</a:t>
             </a:r>
           </a:p>
           <a:p>
@@ -5620,10 +5867,9 @@
               <a:buAutoNum type="arabicPeriod"/>
             </a:pPr>
             <a:r>
-              <a:rPr lang="en-IN" dirty="0"/>
-              <a:t>Incident Management</a:t>
-            </a:r>
-            <a:endParaRPr lang="en-US" dirty="0"/>
+              <a:rPr lang="en-US" dirty="0"/>
+              <a:t>Key engagements for APS team</a:t>
+            </a:r>
           </a:p>
           <a:p>
             <a:pPr marL="514350" indent="-514350">
@@ -5632,9 +5878,8 @@
             </a:pPr>
             <a:r>
               <a:rPr lang="en-IN" dirty="0"/>
-              <a:t>Problem Management</a:t>
-            </a:r>
-            <a:endParaRPr lang="en-US" dirty="0"/>
+              <a:t>Incident Management</a:t>
+            </a:r>
           </a:p>
           <a:p>
             <a:pPr marL="514350" indent="-514350">
@@ -5642,21 +5887,9 @@
               <a:buAutoNum type="arabicPeriod"/>
             </a:pPr>
             <a:r>
-              <a:rPr lang="en-IN" dirty="0"/>
-              <a:t>Change Management</a:t>
-            </a:r>
-            <a:endParaRPr lang="en-US" dirty="0"/>
-          </a:p>
-          <a:p>
-            <a:pPr marL="514350" indent="-514350">
-              <a:buFont typeface="+mj-lt"/>
-              <a:buAutoNum type="arabicPeriod"/>
-            </a:pPr>
-            <a:r>
-              <a:rPr lang="en-IN" dirty="0"/>
-              <a:t>Release and Deployment Management</a:t>
-            </a:r>
-            <a:endParaRPr lang="en-US" dirty="0"/>
+              <a:rPr lang="en-US" dirty="0"/>
+              <a:t>Production Support Team Engagements.</a:t>
+            </a:r>
           </a:p>
           <a:p>
             <a:pPr marL="514350" indent="-514350">
@@ -9094,10 +9327,10 @@
       </p:grpSp>
       <p:pic>
         <p:nvPicPr>
-          <p:cNvPr id="6" name="Picture 5" descr="A person sitting at a desk looking at a computer screen&#10;&#10;Description automatically generated">
+          <p:cNvPr id="4" name="Picture 3">
             <a:extLst>
               <a:ext uri="{FF2B5EF4-FFF2-40B4-BE49-F238E27FC236}">
-                <a16:creationId xmlns:a16="http://schemas.microsoft.com/office/drawing/2014/main" id="{52C9CC5B-4259-2094-5C9E-7A90FE7D463C}"/>
+                <a16:creationId xmlns:a16="http://schemas.microsoft.com/office/drawing/2014/main" id="{E9A0D412-01B0-0E48-C97A-4ACE23011EB1}"/>
               </a:ext>
             </a:extLst>
           </p:cNvPr>
@@ -9106,15 +9339,16 @@
           </p:cNvPicPr>
           <p:nvPr/>
         </p:nvPicPr>
-        <p:blipFill rotWithShape="1">
+        <p:blipFill>
           <a:blip r:embed="rId2"/>
-          <a:srcRect t="12305" b="16502"/>
-          <a:stretch/>
+          <a:stretch>
+            <a:fillRect/>
+          </a:stretch>
         </p:blipFill>
         <p:spPr>
           <a:xfrm>
-            <a:off x="6350317" y="2421683"/>
-            <a:ext cx="5841684" cy="2472012"/>
+            <a:off x="6996245" y="1662493"/>
+            <a:ext cx="4580505" cy="3869419"/>
           </a:xfrm>
           <a:prstGeom prst="rect">
             <a:avLst/>
@@ -9176,7 +9410,7 @@
           <a:p>
             <a:r>
               <a:rPr lang="en-US" sz="3200" b="1" u="sng" dirty="0"/>
-              <a:t>Role of the Production Support Team</a:t>
+              <a:t>Roles &amp; Responsibilities of the Production Support Team</a:t>
             </a:r>
             <a:br>
               <a:rPr lang="en-US" sz="3200" b="1" u="sng" dirty="0"/>
@@ -9203,267 +9437,508 @@
         </p:nvSpPr>
         <p:spPr>
           <a:xfrm>
-            <a:off x="838200" y="1375794"/>
-            <a:ext cx="10515600" cy="4801169"/>
+            <a:off x="302004" y="1375794"/>
+            <a:ext cx="5453544" cy="5327010"/>
           </a:xfrm>
         </p:spPr>
         <p:txBody>
           <a:bodyPr>
-            <a:normAutofit fontScale="55000" lnSpcReduction="20000"/>
+            <a:normAutofit/>
           </a:bodyPr>
           <a:lstStyle/>
           <a:p>
-            <a:pPr algn="just" rtl="0">
+            <a:pPr marL="0" indent="0" algn="just" rtl="0">
+              <a:buNone/>
+            </a:pPr>
+            <a:r>
+              <a:rPr lang="en-US" sz="1600" b="1" u="sng" dirty="0"/>
+              <a:t>L1:</a:t>
+            </a:r>
+          </a:p>
+          <a:p>
+            <a:pPr marL="514350" indent="-514350" algn="just" rtl="0">
               <a:buFont typeface="+mj-lt"/>
               <a:buAutoNum type="arabicPeriod"/>
             </a:pPr>
             <a:r>
-              <a:rPr lang="en-US" b="1" i="0" dirty="0">
-                <a:solidFill>
-                  <a:srgbClr val="282829"/>
-                </a:solidFill>
-                <a:effectLst/>
-                <a:latin typeface="-apple-system"/>
-              </a:rPr>
-              <a:t>Monitoring</a:t>
-            </a:r>
-            <a:r>
-              <a:rPr lang="en-US" b="0" i="0" dirty="0">
-                <a:solidFill>
-                  <a:srgbClr val="282829"/>
-                </a:solidFill>
-                <a:effectLst/>
-                <a:latin typeface="-apple-system"/>
-              </a:rPr>
-              <a:t>: </a:t>
-            </a:r>
-            <a:r>
-              <a:rPr lang="en-US" b="0" i="0" dirty="0" err="1">
-                <a:solidFill>
-                  <a:srgbClr val="282829"/>
-                </a:solidFill>
-                <a:effectLst/>
-                <a:latin typeface="-apple-system"/>
-              </a:rPr>
-              <a:t>He/She</a:t>
-            </a:r>
-            <a:r>
-              <a:rPr lang="en-US" b="0" i="0" dirty="0">
-                <a:solidFill>
-                  <a:srgbClr val="282829"/>
-                </a:solidFill>
-                <a:effectLst/>
-                <a:latin typeface="-apple-system"/>
-              </a:rPr>
-              <a:t> would have to monitor the system very closely and can not afford to leave the system without someone else monitoring it. It is a 24*7 job defined within a team to work in shifts.</a:t>
-            </a:r>
-          </a:p>
-          <a:p>
-            <a:pPr algn="just" rtl="0">
+              <a:rPr lang="en-US" sz="1600" dirty="0"/>
+              <a:t>Incident Management:</a:t>
+            </a:r>
+          </a:p>
+          <a:p>
+            <a:pPr marL="971550" lvl="1" indent="-514350" algn="just">
+              <a:buFont typeface="+mj-lt"/>
+              <a:buAutoNum type="alphaLcParenR"/>
+            </a:pPr>
+            <a:r>
+              <a:rPr lang="en-US" sz="1600" dirty="0"/>
+              <a:t>Resolve Incidents and requests with the help of SOP’s.</a:t>
+            </a:r>
+          </a:p>
+          <a:p>
+            <a:pPr marL="971550" lvl="1" indent="-514350" algn="just">
+              <a:buFont typeface="+mj-lt"/>
+              <a:buAutoNum type="alphaLcParenR"/>
+            </a:pPr>
+            <a:r>
+              <a:rPr lang="en-US" sz="1600" dirty="0"/>
+              <a:t>Acknowledge &amp; Resolve Incidents.</a:t>
+            </a:r>
+          </a:p>
+          <a:p>
+            <a:pPr marL="971550" lvl="1" indent="-514350" algn="just">
+              <a:buFont typeface="+mj-lt"/>
+              <a:buAutoNum type="alphaLcParenR"/>
+            </a:pPr>
+            <a:r>
+              <a:rPr lang="en-US" sz="1600" dirty="0"/>
+              <a:t>Periodically review and decrease the MTTR</a:t>
+            </a:r>
+          </a:p>
+          <a:p>
+            <a:pPr marL="971550" lvl="1" indent="-514350" algn="just">
+              <a:buFont typeface="+mj-lt"/>
+              <a:buAutoNum type="alphaLcParenR"/>
+            </a:pPr>
+            <a:r>
+              <a:rPr lang="en-US" sz="1600" dirty="0"/>
+              <a:t>Prioritize the incidents based upon severity.</a:t>
+            </a:r>
+          </a:p>
+          <a:p>
+            <a:pPr marL="971550" lvl="1" indent="-514350" algn="just">
+              <a:buFont typeface="+mj-lt"/>
+              <a:buAutoNum type="alphaLcParenR"/>
+            </a:pPr>
+            <a:r>
+              <a:rPr lang="en-US" sz="1600" dirty="0"/>
+              <a:t>Escalate and engage L2/Dev in case unable to resolve.</a:t>
+            </a:r>
+          </a:p>
+          <a:p>
+            <a:pPr marL="514350" indent="-514350" algn="just" rtl="0">
               <a:buFont typeface="+mj-lt"/>
               <a:buAutoNum type="arabicPeriod"/>
             </a:pPr>
             <a:r>
-              <a:rPr lang="en-US" b="1" i="0" dirty="0">
-                <a:solidFill>
-                  <a:srgbClr val="282829"/>
-                </a:solidFill>
-                <a:effectLst/>
-                <a:latin typeface="-apple-system"/>
-              </a:rPr>
-              <a:t>On Call Support</a:t>
-            </a:r>
-            <a:r>
-              <a:rPr lang="en-US" b="0" i="0" dirty="0">
-                <a:solidFill>
-                  <a:srgbClr val="282829"/>
-                </a:solidFill>
-                <a:effectLst/>
-                <a:latin typeface="-apple-system"/>
-              </a:rPr>
-              <a:t>: As it is as 24*7 responsibility. In case if some issue occurs after working hours then He/she would have to be available to resolve the issue on priority.</a:t>
-            </a:r>
-          </a:p>
-          <a:p>
-            <a:pPr algn="just" rtl="0">
+              <a:rPr lang="en-US" sz="1600" dirty="0"/>
+              <a:t>Knowledge on Monitoring tools like Splunk, AppDynamics.</a:t>
+            </a:r>
+          </a:p>
+          <a:p>
+            <a:pPr marL="514350" indent="-514350" algn="just" rtl="0">
               <a:buFont typeface="+mj-lt"/>
               <a:buAutoNum type="arabicPeriod"/>
             </a:pPr>
             <a:r>
-              <a:rPr lang="en-US" b="1" i="0" dirty="0">
-                <a:solidFill>
-                  <a:srgbClr val="282829"/>
-                </a:solidFill>
-                <a:effectLst/>
-                <a:latin typeface="-apple-system"/>
-              </a:rPr>
-              <a:t>P1, P2, P3 Priority Issues</a:t>
-            </a:r>
-            <a:r>
-              <a:rPr lang="en-US" b="0" i="0" dirty="0">
-                <a:solidFill>
-                  <a:srgbClr val="282829"/>
-                </a:solidFill>
-                <a:effectLst/>
-                <a:latin typeface="-apple-system"/>
-              </a:rPr>
-              <a:t>: Issues are raised based on the priorities. P1&gt;P2&gt;P3… P1 has very tight timeline to resolve the issue as It means the Business is down with this issue and it needs to be fixed at priority as It would be impacting business and would cause the monetary loss to the company.</a:t>
-            </a:r>
-          </a:p>
-          <a:p>
-            <a:pPr algn="just" rtl="0">
+              <a:rPr lang="en-US" sz="1600" dirty="0"/>
+              <a:t>Email alerts monitor and handling. </a:t>
+            </a:r>
+          </a:p>
+          <a:p>
+            <a:pPr marL="514350" indent="-514350" algn="just" rtl="0">
               <a:buFont typeface="+mj-lt"/>
               <a:buAutoNum type="arabicPeriod"/>
             </a:pPr>
             <a:r>
-              <a:rPr lang="en-US" b="1" i="0" dirty="0">
-                <a:solidFill>
-                  <a:srgbClr val="282829"/>
-                </a:solidFill>
-                <a:effectLst/>
-                <a:latin typeface="-apple-system"/>
-              </a:rPr>
-              <a:t>Categorization of Issues</a:t>
-            </a:r>
-            <a:r>
-              <a:rPr lang="en-US" b="0" i="0" dirty="0">
-                <a:solidFill>
-                  <a:srgbClr val="282829"/>
-                </a:solidFill>
-                <a:effectLst/>
-                <a:latin typeface="-apple-system"/>
-              </a:rPr>
-              <a:t>: Report needs to be created to check what are the frequent issues we are getting and what is reason for that and If it can be resolved with some code changes so that such kind of issue do not originate in future.</a:t>
-            </a:r>
-          </a:p>
-          <a:p>
-            <a:pPr algn="just" rtl="0">
+              <a:rPr lang="en-US" sz="1600" dirty="0"/>
+              <a:t>Daily review of ServiceNow/Tableau dashboards.</a:t>
+            </a:r>
+          </a:p>
+          <a:p>
+            <a:pPr marL="514350" indent="-514350" algn="just" rtl="0">
               <a:buFont typeface="+mj-lt"/>
               <a:buAutoNum type="arabicPeriod"/>
             </a:pPr>
             <a:r>
-              <a:rPr lang="en-US" b="1" i="0" dirty="0">
-                <a:solidFill>
-                  <a:srgbClr val="282829"/>
-                </a:solidFill>
-                <a:effectLst/>
-                <a:latin typeface="-apple-system"/>
-              </a:rPr>
-              <a:t>SOP Document</a:t>
-            </a:r>
-            <a:r>
-              <a:rPr lang="en-US" b="0" i="0" dirty="0">
-                <a:solidFill>
-                  <a:srgbClr val="282829"/>
-                </a:solidFill>
-                <a:effectLst/>
-                <a:latin typeface="-apple-system"/>
-              </a:rPr>
-              <a:t>: SOP document needs to be created. This document lists the regular issues coming and steps needs to be taken to resolve such issues. SOP document then shared with the L1 Support team so that they can resolve the issue at their end by following the steps mentioned in the document.</a:t>
-            </a:r>
-          </a:p>
-          <a:p>
-            <a:pPr algn="just" rtl="0">
+              <a:rPr lang="en-US" sz="1600" dirty="0"/>
+              <a:t>Regular connect and scrum call with respective function lead.</a:t>
+            </a:r>
+          </a:p>
+          <a:p>
+            <a:pPr marL="514350" indent="-514350" algn="just" rtl="0">
               <a:buFont typeface="+mj-lt"/>
               <a:buAutoNum type="arabicPeriod"/>
             </a:pPr>
             <a:r>
-              <a:rPr lang="en-US" b="1" i="0" dirty="0">
+              <a:rPr lang="en-US" sz="1600" dirty="0"/>
+              <a:t>Weekend Sanity Support – </a:t>
+            </a:r>
+            <a:r>
+              <a:rPr lang="en-US" sz="1600" dirty="0" err="1"/>
+              <a:t>Adhoc</a:t>
+            </a:r>
+            <a:r>
+              <a:rPr lang="en-US" sz="1600" dirty="0"/>
+              <a:t> and scheduled. </a:t>
+            </a:r>
+          </a:p>
+          <a:p>
+            <a:pPr marL="971550" lvl="1" indent="-514350" algn="just">
+              <a:buFont typeface="+mj-lt"/>
+              <a:buAutoNum type="alphaLcParenR"/>
+            </a:pPr>
+            <a:endParaRPr lang="en-US" sz="1600" dirty="0"/>
+          </a:p>
+          <a:p>
+            <a:pPr marL="971550" lvl="1" indent="-514350" algn="just">
+              <a:buFont typeface="+mj-lt"/>
+              <a:buAutoNum type="alphaLcParenR"/>
+            </a:pPr>
+            <a:endParaRPr lang="en-US" sz="1600" dirty="0"/>
+          </a:p>
+          <a:p>
+            <a:pPr marL="457200" lvl="1" indent="0" algn="just">
+              <a:buNone/>
+            </a:pPr>
+            <a:endParaRPr lang="en-US" sz="1600" dirty="0"/>
+          </a:p>
+        </p:txBody>
+      </p:sp>
+      <p:sp>
+        <p:nvSpPr>
+          <p:cNvPr id="4" name="Content Placeholder 2">
+            <a:extLst>
+              <a:ext uri="{FF2B5EF4-FFF2-40B4-BE49-F238E27FC236}">
+                <a16:creationId xmlns:a16="http://schemas.microsoft.com/office/drawing/2014/main" id="{4CD9A78D-498A-8969-FC4C-C8D45DEC7231}"/>
+              </a:ext>
+            </a:extLst>
+          </p:cNvPr>
+          <p:cNvSpPr txBox="1">
+            <a:spLocks/>
+          </p:cNvSpPr>
+          <p:nvPr/>
+        </p:nvSpPr>
+        <p:spPr>
+          <a:xfrm>
+            <a:off x="6191075" y="1375795"/>
+            <a:ext cx="5813571" cy="5234730"/>
+          </a:xfrm>
+          <a:prstGeom prst="rect">
+            <a:avLst/>
+          </a:prstGeom>
+        </p:spPr>
+        <p:txBody>
+          <a:bodyPr vert="horz" lIns="91440" tIns="45720" rIns="91440" bIns="45720" rtlCol="0">
+            <a:normAutofit fontScale="62500" lnSpcReduction="20000"/>
+          </a:bodyPr>
+          <a:lstStyle>
+            <a:lvl1pPr marL="228600" indent="-228600" algn="l" defTabSz="914400" rtl="0" eaLnBrk="1" latinLnBrk="0" hangingPunct="1">
+              <a:lnSpc>
+                <a:spcPct val="90000"/>
+              </a:lnSpc>
+              <a:spcBef>
+                <a:spcPts val="1000"/>
+              </a:spcBef>
+              <a:buFont typeface="Arial" panose="020B0604020202020204" pitchFamily="34" charset="0"/>
+              <a:buChar char="•"/>
+              <a:defRPr sz="2800" kern="1200">
                 <a:solidFill>
-                  <a:srgbClr val="282829"/>
+                  <a:schemeClr val="tx1"/>
                 </a:solidFill>
-                <a:effectLst/>
-                <a:latin typeface="-apple-system"/>
-              </a:rPr>
-              <a:t>Deployments</a:t>
-            </a:r>
-            <a:r>
-              <a:rPr lang="en-US" b="0" i="0" dirty="0">
+                <a:latin typeface="+mn-lt"/>
+                <a:ea typeface="+mn-ea"/>
+                <a:cs typeface="+mn-cs"/>
+              </a:defRPr>
+            </a:lvl1pPr>
+            <a:lvl2pPr marL="685800" indent="-228600" algn="l" defTabSz="914400" rtl="0" eaLnBrk="1" latinLnBrk="0" hangingPunct="1">
+              <a:lnSpc>
+                <a:spcPct val="90000"/>
+              </a:lnSpc>
+              <a:spcBef>
+                <a:spcPts val="500"/>
+              </a:spcBef>
+              <a:buFont typeface="Arial" panose="020B0604020202020204" pitchFamily="34" charset="0"/>
+              <a:buChar char="•"/>
+              <a:defRPr sz="2400" kern="1200">
                 <a:solidFill>
-                  <a:srgbClr val="282829"/>
+                  <a:schemeClr val="tx1"/>
                 </a:solidFill>
-                <a:effectLst/>
-                <a:latin typeface="-apple-system"/>
-              </a:rPr>
-              <a:t>: Support teams remain part of the deployments along with development team so that they will be familiar with changes that are getting deployed to the production as they would have to support the Application after it gets deployed to the Production.</a:t>
-            </a:r>
-          </a:p>
-          <a:p>
-            <a:pPr algn="just" rtl="0">
+                <a:latin typeface="+mn-lt"/>
+                <a:ea typeface="+mn-ea"/>
+                <a:cs typeface="+mn-cs"/>
+              </a:defRPr>
+            </a:lvl2pPr>
+            <a:lvl3pPr marL="1143000" indent="-228600" algn="l" defTabSz="914400" rtl="0" eaLnBrk="1" latinLnBrk="0" hangingPunct="1">
+              <a:lnSpc>
+                <a:spcPct val="90000"/>
+              </a:lnSpc>
+              <a:spcBef>
+                <a:spcPts val="500"/>
+              </a:spcBef>
+              <a:buFont typeface="Arial" panose="020B0604020202020204" pitchFamily="34" charset="0"/>
+              <a:buChar char="•"/>
+              <a:defRPr sz="2000" kern="1200">
+                <a:solidFill>
+                  <a:schemeClr val="tx1"/>
+                </a:solidFill>
+                <a:latin typeface="+mn-lt"/>
+                <a:ea typeface="+mn-ea"/>
+                <a:cs typeface="+mn-cs"/>
+              </a:defRPr>
+            </a:lvl3pPr>
+            <a:lvl4pPr marL="1600200" indent="-228600" algn="l" defTabSz="914400" rtl="0" eaLnBrk="1" latinLnBrk="0" hangingPunct="1">
+              <a:lnSpc>
+                <a:spcPct val="90000"/>
+              </a:lnSpc>
+              <a:spcBef>
+                <a:spcPts val="500"/>
+              </a:spcBef>
+              <a:buFont typeface="Arial" panose="020B0604020202020204" pitchFamily="34" charset="0"/>
+              <a:buChar char="•"/>
+              <a:defRPr sz="1800" kern="1200">
+                <a:solidFill>
+                  <a:schemeClr val="tx1"/>
+                </a:solidFill>
+                <a:latin typeface="+mn-lt"/>
+                <a:ea typeface="+mn-ea"/>
+                <a:cs typeface="+mn-cs"/>
+              </a:defRPr>
+            </a:lvl4pPr>
+            <a:lvl5pPr marL="2057400" indent="-228600" algn="l" defTabSz="914400" rtl="0" eaLnBrk="1" latinLnBrk="0" hangingPunct="1">
+              <a:lnSpc>
+                <a:spcPct val="90000"/>
+              </a:lnSpc>
+              <a:spcBef>
+                <a:spcPts val="500"/>
+              </a:spcBef>
+              <a:buFont typeface="Arial" panose="020B0604020202020204" pitchFamily="34" charset="0"/>
+              <a:buChar char="•"/>
+              <a:defRPr sz="1800" kern="1200">
+                <a:solidFill>
+                  <a:schemeClr val="tx1"/>
+                </a:solidFill>
+                <a:latin typeface="+mn-lt"/>
+                <a:ea typeface="+mn-ea"/>
+                <a:cs typeface="+mn-cs"/>
+              </a:defRPr>
+            </a:lvl5pPr>
+            <a:lvl6pPr marL="2514600" indent="-228600" algn="l" defTabSz="914400" rtl="0" eaLnBrk="1" latinLnBrk="0" hangingPunct="1">
+              <a:lnSpc>
+                <a:spcPct val="90000"/>
+              </a:lnSpc>
+              <a:spcBef>
+                <a:spcPts val="500"/>
+              </a:spcBef>
+              <a:buFont typeface="Arial" panose="020B0604020202020204" pitchFamily="34" charset="0"/>
+              <a:buChar char="•"/>
+              <a:defRPr sz="1800" kern="1200">
+                <a:solidFill>
+                  <a:schemeClr val="tx1"/>
+                </a:solidFill>
+                <a:latin typeface="+mn-lt"/>
+                <a:ea typeface="+mn-ea"/>
+                <a:cs typeface="+mn-cs"/>
+              </a:defRPr>
+            </a:lvl6pPr>
+            <a:lvl7pPr marL="2971800" indent="-228600" algn="l" defTabSz="914400" rtl="0" eaLnBrk="1" latinLnBrk="0" hangingPunct="1">
+              <a:lnSpc>
+                <a:spcPct val="90000"/>
+              </a:lnSpc>
+              <a:spcBef>
+                <a:spcPts val="500"/>
+              </a:spcBef>
+              <a:buFont typeface="Arial" panose="020B0604020202020204" pitchFamily="34" charset="0"/>
+              <a:buChar char="•"/>
+              <a:defRPr sz="1800" kern="1200">
+                <a:solidFill>
+                  <a:schemeClr val="tx1"/>
+                </a:solidFill>
+                <a:latin typeface="+mn-lt"/>
+                <a:ea typeface="+mn-ea"/>
+                <a:cs typeface="+mn-cs"/>
+              </a:defRPr>
+            </a:lvl7pPr>
+            <a:lvl8pPr marL="3429000" indent="-228600" algn="l" defTabSz="914400" rtl="0" eaLnBrk="1" latinLnBrk="0" hangingPunct="1">
+              <a:lnSpc>
+                <a:spcPct val="90000"/>
+              </a:lnSpc>
+              <a:spcBef>
+                <a:spcPts val="500"/>
+              </a:spcBef>
+              <a:buFont typeface="Arial" panose="020B0604020202020204" pitchFamily="34" charset="0"/>
+              <a:buChar char="•"/>
+              <a:defRPr sz="1800" kern="1200">
+                <a:solidFill>
+                  <a:schemeClr val="tx1"/>
+                </a:solidFill>
+                <a:latin typeface="+mn-lt"/>
+                <a:ea typeface="+mn-ea"/>
+                <a:cs typeface="+mn-cs"/>
+              </a:defRPr>
+            </a:lvl8pPr>
+            <a:lvl9pPr marL="3886200" indent="-228600" algn="l" defTabSz="914400" rtl="0" eaLnBrk="1" latinLnBrk="0" hangingPunct="1">
+              <a:lnSpc>
+                <a:spcPct val="90000"/>
+              </a:lnSpc>
+              <a:spcBef>
+                <a:spcPts val="500"/>
+              </a:spcBef>
+              <a:buFont typeface="Arial" panose="020B0604020202020204" pitchFamily="34" charset="0"/>
+              <a:buChar char="•"/>
+              <a:defRPr sz="1800" kern="1200">
+                <a:solidFill>
+                  <a:schemeClr val="tx1"/>
+                </a:solidFill>
+                <a:latin typeface="+mn-lt"/>
+                <a:ea typeface="+mn-ea"/>
+                <a:cs typeface="+mn-cs"/>
+              </a:defRPr>
+            </a:lvl9pPr>
+          </a:lstStyle>
+          <a:p>
+            <a:pPr marL="0" indent="0" algn="just">
+              <a:buFont typeface="Arial" panose="020B0604020202020204" pitchFamily="34" charset="0"/>
+              <a:buNone/>
+            </a:pPr>
+            <a:r>
+              <a:rPr lang="en-US" sz="2600" b="1" u="sng" dirty="0"/>
+              <a:t>L2:</a:t>
+            </a:r>
+          </a:p>
+          <a:p>
+            <a:pPr marL="514350" indent="-514350" algn="just" rtl="0">
               <a:buFont typeface="+mj-lt"/>
               <a:buAutoNum type="arabicPeriod"/>
             </a:pPr>
             <a:r>
-              <a:rPr lang="en-US" b="1" i="0" dirty="0">
-                <a:solidFill>
-                  <a:srgbClr val="282829"/>
-                </a:solidFill>
-                <a:effectLst/>
-                <a:latin typeface="-apple-system"/>
-              </a:rPr>
-              <a:t>L1, L2, L3 </a:t>
-            </a:r>
-            <a:r>
-              <a:rPr lang="en-US" b="0" i="0" dirty="0">
-                <a:solidFill>
-                  <a:srgbClr val="282829"/>
-                </a:solidFill>
-                <a:effectLst/>
-                <a:latin typeface="-apple-system"/>
-              </a:rPr>
-              <a:t>: Support is Categorized to L1, L2 and L3 Support.</a:t>
-            </a:r>
-          </a:p>
-          <a:p>
-            <a:pPr algn="just" rtl="0">
+              <a:rPr lang="en-US" sz="2600" dirty="0"/>
+              <a:t>SME level knowledge of Business applications:</a:t>
+            </a:r>
+          </a:p>
+          <a:p>
+            <a:pPr marL="971550" lvl="1" indent="-514350" algn="just">
+              <a:buFont typeface="+mj-lt"/>
+              <a:buAutoNum type="alphaLcParenR"/>
+            </a:pPr>
+            <a:r>
+              <a:rPr lang="en-US" sz="2600" dirty="0"/>
+              <a:t>Have the architecture level knowledge.</a:t>
+            </a:r>
+          </a:p>
+          <a:p>
+            <a:pPr marL="971550" lvl="1" indent="-514350" algn="just">
+              <a:buFont typeface="+mj-lt"/>
+              <a:buAutoNum type="alphaLcParenR"/>
+            </a:pPr>
+            <a:r>
+              <a:rPr lang="en-US" sz="2600" dirty="0"/>
+              <a:t>Have dev contacts and servers/DB level details.</a:t>
+            </a:r>
+          </a:p>
+          <a:p>
+            <a:pPr marL="971550" lvl="1" indent="-514350" algn="just">
+              <a:buFont typeface="+mj-lt"/>
+              <a:buAutoNum type="alphaLcParenR"/>
+            </a:pPr>
+            <a:r>
+              <a:rPr lang="en-US" sz="2600" dirty="0"/>
+              <a:t>Well equipped with log analysis.</a:t>
+            </a:r>
+          </a:p>
+          <a:p>
+            <a:pPr marL="971550" lvl="1" indent="-514350" algn="just">
+              <a:buFont typeface="+mj-lt"/>
+              <a:buAutoNum type="alphaLcParenR"/>
+            </a:pPr>
+            <a:r>
+              <a:rPr lang="en-US" sz="2600" dirty="0"/>
+              <a:t>Periodic review of Infra, </a:t>
+            </a:r>
+            <a:r>
+              <a:rPr lang="en-US" sz="2600" dirty="0" err="1"/>
+              <a:t>ControlM</a:t>
+            </a:r>
+            <a:r>
+              <a:rPr lang="en-US" sz="2600" dirty="0"/>
+              <a:t>, DB, AppDynamics, Splunk alerts.</a:t>
+            </a:r>
+          </a:p>
+          <a:p>
+            <a:pPr marL="971550" lvl="1" indent="-514350" algn="just">
+              <a:buFont typeface="+mj-lt"/>
+              <a:buAutoNum type="alphaLcParenR"/>
+            </a:pPr>
+            <a:r>
+              <a:rPr lang="en-US" sz="2600" dirty="0"/>
+              <a:t>Have knowledge to debug and to carry out RCA.</a:t>
+            </a:r>
+          </a:p>
+          <a:p>
+            <a:pPr marL="514350" indent="-514350" algn="just" rtl="0">
+              <a:buFont typeface="+mj-lt"/>
+              <a:buAutoNum type="arabicPeriod"/>
+            </a:pPr>
+            <a:r>
+              <a:rPr lang="en-US" sz="2600" dirty="0"/>
+              <a:t>Triage critical business outages with the help of various stakeholders and communicate with dev, infra and Senior Management.</a:t>
+            </a:r>
+          </a:p>
+          <a:p>
+            <a:pPr marL="514350" indent="-514350" algn="just" rtl="0">
+              <a:buFont typeface="+mj-lt"/>
+              <a:buAutoNum type="arabicPeriod"/>
+            </a:pPr>
+            <a:r>
+              <a:rPr lang="en-US" sz="2600" dirty="0"/>
+              <a:t>Develop SOPs or KB for recurring incidents or SRs </a:t>
+            </a:r>
+          </a:p>
+          <a:p>
+            <a:pPr marL="514350" indent="-514350" algn="just" rtl="0">
+              <a:buFont typeface="+mj-lt"/>
+              <a:buAutoNum type="arabicPeriod"/>
+            </a:pPr>
+            <a:r>
+              <a:rPr lang="en-US" sz="2600" dirty="0"/>
+              <a:t>Problem management </a:t>
+            </a:r>
+          </a:p>
+          <a:p>
+            <a:pPr marL="514350" indent="-514350" algn="just" rtl="0">
+              <a:buFont typeface="+mj-lt"/>
+              <a:buAutoNum type="arabicPeriod"/>
+            </a:pPr>
+            <a:r>
+              <a:rPr lang="en-US" sz="2600" dirty="0"/>
+              <a:t>Incident Management (extension of L1 support)</a:t>
+            </a:r>
+          </a:p>
+          <a:p>
+            <a:pPr marL="514350" indent="-514350" algn="just" rtl="0">
+              <a:buFont typeface="+mj-lt"/>
+              <a:buAutoNum type="arabicPeriod"/>
+            </a:pPr>
+            <a:r>
+              <a:rPr lang="en-US" sz="2600" dirty="0"/>
+              <a:t>Sync with Change and Infra team for weekend changes and prioritize sanity and impact </a:t>
+            </a:r>
+          </a:p>
+          <a:p>
+            <a:pPr marL="514350" indent="-514350" algn="just" rtl="0">
+              <a:buFont typeface="+mj-lt"/>
+              <a:buAutoNum type="arabicPeriod"/>
+            </a:pPr>
+            <a:r>
+              <a:rPr lang="en-US" sz="2600" dirty="0"/>
+              <a:t>Regular review of ServiceNow/Tableau dashboards</a:t>
+            </a:r>
+          </a:p>
+          <a:p>
+            <a:pPr marL="0" indent="0" algn="just" rtl="0">
+              <a:buNone/>
+            </a:pPr>
+            <a:endParaRPr lang="en-US" sz="2600" dirty="0"/>
+          </a:p>
+          <a:p>
+            <a:pPr marL="0" indent="0" algn="just">
               <a:buFont typeface="Arial" panose="020B0604020202020204" pitchFamily="34" charset="0"/>
-              <a:buChar char="•"/>
+              <a:buNone/>
             </a:pPr>
             <a:r>
-              <a:rPr lang="en-US" b="0" i="0" dirty="0">
-                <a:solidFill>
-                  <a:srgbClr val="282829"/>
-                </a:solidFill>
-                <a:effectLst/>
-                <a:latin typeface="-apple-system"/>
-              </a:rPr>
-              <a:t>L1: L1 team is the first point of contact when someone raises the issue. You can say Customer support team is the L1 Support whom the person contacts when he faces any issue in the product. They check information and get back to the Customer.</a:t>
-            </a:r>
-          </a:p>
-          <a:p>
-            <a:pPr algn="just" rtl="0">
-              <a:buFont typeface="Arial" panose="020B0604020202020204" pitchFamily="34" charset="0"/>
-              <a:buChar char="•"/>
-            </a:pPr>
-            <a:r>
-              <a:rPr lang="en-US" b="0" i="0" dirty="0">
-                <a:solidFill>
-                  <a:srgbClr val="282829"/>
-                </a:solidFill>
-                <a:effectLst/>
-                <a:latin typeface="-apple-system"/>
-              </a:rPr>
-              <a:t>L2: If issue is not getting resolved by the L1 support then that issue gets passed to the L2 Support. L2 Support check configuration and other things which can help in resolving the issue.</a:t>
-            </a:r>
-          </a:p>
-          <a:p>
-            <a:pPr algn="just" rtl="0">
-              <a:buFont typeface="Arial" panose="020B0604020202020204" pitchFamily="34" charset="0"/>
-              <a:buChar char="•"/>
-            </a:pPr>
-            <a:r>
-              <a:rPr lang="en-US" b="0" i="0" dirty="0">
-                <a:solidFill>
-                  <a:srgbClr val="282829"/>
-                </a:solidFill>
-                <a:effectLst/>
-                <a:latin typeface="-apple-system"/>
-              </a:rPr>
-              <a:t>L3: In case if L2 team also not able to resolve the issue and Issue might need some code changes then Issue gets transferred to the L3 Support team. L3 Support team is a technical team which works on the change requests and maintenance of the Application.</a:t>
-            </a:r>
-          </a:p>
-          <a:p>
-            <a:pPr algn="just"/>
+              <a:rPr lang="en-US" dirty="0"/>
+              <a:t> </a:t>
+            </a:r>
             <a:endParaRPr lang="en-IN" dirty="0"/>
           </a:p>
         </p:txBody>
@@ -9482,6 +9957,94 @@
 </file>
 
 <file path=ppt/slides/slide6.xml><?xml version="1.0" encoding="utf-8"?>
+<p:sld xmlns:a="http://schemas.openxmlformats.org/drawingml/2006/main" xmlns:r="http://schemas.openxmlformats.org/officeDocument/2006/relationships" xmlns:p="http://schemas.openxmlformats.org/presentationml/2006/main">
+  <p:cSld>
+    <p:spTree>
+      <p:nvGrpSpPr>
+        <p:cNvPr id="1" name=""/>
+        <p:cNvGrpSpPr/>
+        <p:nvPr/>
+      </p:nvGrpSpPr>
+      <p:grpSpPr>
+        <a:xfrm>
+          <a:off x="0" y="0"/>
+          <a:ext cx="0" cy="0"/>
+          <a:chOff x="0" y="0"/>
+          <a:chExt cx="0" cy="0"/>
+        </a:xfrm>
+      </p:grpSpPr>
+      <p:sp>
+        <p:nvSpPr>
+          <p:cNvPr id="2" name="Title 1">
+            <a:extLst>
+              <a:ext uri="{FF2B5EF4-FFF2-40B4-BE49-F238E27FC236}">
+                <a16:creationId xmlns:a16="http://schemas.microsoft.com/office/drawing/2014/main" id="{A362B928-DB64-95E8-66FF-7694AC33DD94}"/>
+              </a:ext>
+            </a:extLst>
+          </p:cNvPr>
+          <p:cNvSpPr>
+            <a:spLocks noGrp="1"/>
+          </p:cNvSpPr>
+          <p:nvPr>
+            <p:ph type="title"/>
+          </p:nvPr>
+        </p:nvSpPr>
+        <p:spPr/>
+        <p:txBody>
+          <a:bodyPr/>
+          <a:lstStyle/>
+          <a:p>
+            <a:r>
+              <a:rPr lang="en-US" dirty="0"/>
+              <a:t>APS TEAM -&gt; ADDITIONAL ACTIVITIES</a:t>
+            </a:r>
+            <a:endParaRPr lang="en-IN" dirty="0"/>
+          </a:p>
+        </p:txBody>
+      </p:sp>
+      <p:pic>
+        <p:nvPicPr>
+          <p:cNvPr id="5" name="Content Placeholder 4">
+            <a:extLst>
+              <a:ext uri="{FF2B5EF4-FFF2-40B4-BE49-F238E27FC236}">
+                <a16:creationId xmlns:a16="http://schemas.microsoft.com/office/drawing/2014/main" id="{6B203A38-1B65-6FEA-264C-7207368BE58F}"/>
+              </a:ext>
+            </a:extLst>
+          </p:cNvPr>
+          <p:cNvPicPr>
+            <a:picLocks noGrp="1" noChangeAspect="1"/>
+          </p:cNvPicPr>
+          <p:nvPr>
+            <p:ph idx="1"/>
+          </p:nvPr>
+        </p:nvPicPr>
+        <p:blipFill>
+          <a:blip r:embed="rId2"/>
+          <a:stretch>
+            <a:fillRect/>
+          </a:stretch>
+        </p:blipFill>
+        <p:spPr>
+          <a:xfrm>
+            <a:off x="2616920" y="1825625"/>
+            <a:ext cx="6958160" cy="4351338"/>
+          </a:xfrm>
+        </p:spPr>
+      </p:pic>
+    </p:spTree>
+    <p:extLst>
+      <p:ext uri="{BB962C8B-B14F-4D97-AF65-F5344CB8AC3E}">
+        <p14:creationId xmlns:p14="http://schemas.microsoft.com/office/powerpoint/2010/main" val="53375226"/>
+      </p:ext>
+    </p:extLst>
+  </p:cSld>
+  <p:clrMapOvr>
+    <a:masterClrMapping/>
+  </p:clrMapOvr>
+</p:sld>
+</file>
+
+<file path=ppt/slides/slide7.xml><?xml version="1.0" encoding="utf-8"?>
 <p:sld xmlns:a="http://schemas.openxmlformats.org/drawingml/2006/main" xmlns:r="http://schemas.openxmlformats.org/officeDocument/2006/relationships" xmlns:p="http://schemas.openxmlformats.org/presentationml/2006/main">
   <p:cSld>
     <p:bg>
@@ -9595,13 +10158,13 @@
           <a:lstStyle/>
           <a:p>
             <a:r>
-              <a:rPr lang="en-US" sz="2600" b="1" u="sng"/>
-              <a:t>Key Responsibilities of the Production Support Team</a:t>
+              <a:rPr lang="en-US" sz="2600" b="1" u="sng" dirty="0"/>
+              <a:t>Key engagements for APS team</a:t>
             </a:r>
             <a:br>
-              <a:rPr lang="en-US" sz="2600"/>
+              <a:rPr lang="en-US" sz="2600" dirty="0"/>
             </a:br>
-            <a:endParaRPr lang="en-IN" sz="2600"/>
+            <a:endParaRPr lang="en-IN" sz="2600" dirty="0"/>
           </a:p>
         </p:txBody>
       </p:sp>
@@ -9907,28 +10470,28 @@
           <a:lstStyle/>
           <a:p>
             <a:r>
-              <a:rPr lang="en-US" sz="2200"/>
+              <a:rPr lang="en-US" sz="2200" dirty="0"/>
               <a:t>Incident management</a:t>
             </a:r>
           </a:p>
           <a:p>
             <a:r>
-              <a:rPr lang="en-US" sz="2200"/>
+              <a:rPr lang="en-US" sz="2200" dirty="0"/>
               <a:t>Problem management</a:t>
             </a:r>
           </a:p>
           <a:p>
             <a:r>
-              <a:rPr lang="en-US" sz="2200"/>
+              <a:rPr lang="en-US" sz="2200" dirty="0"/>
               <a:t>Change management</a:t>
             </a:r>
           </a:p>
           <a:p>
             <a:r>
-              <a:rPr lang="en-US" sz="2200"/>
+              <a:rPr lang="en-US" sz="2200" dirty="0"/>
               <a:t>Release and deployment management</a:t>
             </a:r>
-            <a:endParaRPr lang="en-IN" sz="2200"/>
+            <a:endParaRPr lang="en-IN" sz="2200" dirty="0"/>
           </a:p>
         </p:txBody>
       </p:sp>
@@ -9975,7 +10538,7 @@
 </p:sld>
 </file>
 
-<file path=ppt/slides/slide7.xml><?xml version="1.0" encoding="utf-8"?>
+<file path=ppt/slides/slide8.xml><?xml version="1.0" encoding="utf-8"?>
 <p:sld xmlns:a="http://schemas.openxmlformats.org/drawingml/2006/main" xmlns:r="http://schemas.openxmlformats.org/officeDocument/2006/relationships" xmlns:p="http://schemas.openxmlformats.org/presentationml/2006/main">
   <p:cSld>
     <p:spTree>
@@ -10152,102 +10715,6 @@
 </p:sld>
 </file>
 
-<file path=ppt/slides/slide8.xml><?xml version="1.0" encoding="utf-8"?>
-<p:sld xmlns:a="http://schemas.openxmlformats.org/drawingml/2006/main" xmlns:r="http://schemas.openxmlformats.org/officeDocument/2006/relationships" xmlns:p="http://schemas.openxmlformats.org/presentationml/2006/main">
-  <p:cSld>
-    <p:spTree>
-      <p:nvGrpSpPr>
-        <p:cNvPr id="1" name=""/>
-        <p:cNvGrpSpPr/>
-        <p:nvPr/>
-      </p:nvGrpSpPr>
-      <p:grpSpPr>
-        <a:xfrm>
-          <a:off x="0" y="0"/>
-          <a:ext cx="0" cy="0"/>
-          <a:chOff x="0" y="0"/>
-          <a:chExt cx="0" cy="0"/>
-        </a:xfrm>
-      </p:grpSpPr>
-      <p:sp>
-        <p:nvSpPr>
-          <p:cNvPr id="2" name="Title 1">
-            <a:extLst>
-              <a:ext uri="{FF2B5EF4-FFF2-40B4-BE49-F238E27FC236}">
-                <a16:creationId xmlns:a16="http://schemas.microsoft.com/office/drawing/2014/main" id="{1B983FA9-8657-D664-FCB3-FF64B41F0E7B}"/>
-              </a:ext>
-            </a:extLst>
-          </p:cNvPr>
-          <p:cNvSpPr>
-            <a:spLocks noGrp="1"/>
-          </p:cNvSpPr>
-          <p:nvPr>
-            <p:ph type="title"/>
-          </p:nvPr>
-        </p:nvSpPr>
-        <p:spPr/>
-        <p:txBody>
-          <a:bodyPr>
-            <a:normAutofit/>
-          </a:bodyPr>
-          <a:lstStyle/>
-          <a:p>
-            <a:r>
-              <a:rPr lang="en-US" sz="3200" b="1" u="sng" dirty="0"/>
-              <a:t>INCIDENT PROCESS:</a:t>
-            </a:r>
-            <a:endParaRPr lang="en-IN" sz="3200" b="1" u="sng" dirty="0"/>
-          </a:p>
-        </p:txBody>
-      </p:sp>
-      <p:pic>
-        <p:nvPicPr>
-          <p:cNvPr id="5" name="Content Placeholder 4" descr="A diagram of a company&#10;&#10;Description automatically generated">
-            <a:extLst>
-              <a:ext uri="{FF2B5EF4-FFF2-40B4-BE49-F238E27FC236}">
-                <a16:creationId xmlns:a16="http://schemas.microsoft.com/office/drawing/2014/main" id="{1C309B9B-C684-AA07-7D1E-86F894B90EBF}"/>
-              </a:ext>
-            </a:extLst>
-          </p:cNvPr>
-          <p:cNvPicPr>
-            <a:picLocks noGrp="1" noChangeAspect="1"/>
-          </p:cNvPicPr>
-          <p:nvPr>
-            <p:ph idx="1"/>
-          </p:nvPr>
-        </p:nvPicPr>
-        <p:blipFill>
-          <a:blip r:embed="rId2">
-            <a:extLst>
-              <a:ext uri="{28A0092B-C50C-407E-A947-70E740481C1C}">
-                <a14:useLocalDpi xmlns:a14="http://schemas.microsoft.com/office/drawing/2010/main" val="0"/>
-              </a:ext>
-            </a:extLst>
-          </a:blip>
-          <a:stretch>
-            <a:fillRect/>
-          </a:stretch>
-        </p:blipFill>
-        <p:spPr>
-          <a:xfrm>
-            <a:off x="692726" y="1825625"/>
-            <a:ext cx="10834255" cy="4898448"/>
-          </a:xfrm>
-        </p:spPr>
-      </p:pic>
-    </p:spTree>
-    <p:extLst>
-      <p:ext uri="{BB962C8B-B14F-4D97-AF65-F5344CB8AC3E}">
-        <p14:creationId xmlns:p14="http://schemas.microsoft.com/office/powerpoint/2010/main" val="1569063382"/>
-      </p:ext>
-    </p:extLst>
-  </p:cSld>
-  <p:clrMapOvr>
-    <a:masterClrMapping/>
-  </p:clrMapOvr>
-</p:sld>
-</file>
-
 <file path=ppt/slides/slide9.xml><?xml version="1.0" encoding="utf-8"?>
 <p:sld xmlns:a="http://schemas.openxmlformats.org/drawingml/2006/main" xmlns:r="http://schemas.openxmlformats.org/officeDocument/2006/relationships" xmlns:p="http://schemas.openxmlformats.org/presentationml/2006/main">
   <p:cSld>
@@ -10270,7 +10737,7 @@
           <p:cNvPr id="2" name="Title 1">
             <a:extLst>
               <a:ext uri="{FF2B5EF4-FFF2-40B4-BE49-F238E27FC236}">
-                <a16:creationId xmlns:a16="http://schemas.microsoft.com/office/drawing/2014/main" id="{EAEF8827-3A58-7F11-C92E-920742482E2D}"/>
+                <a16:creationId xmlns:a16="http://schemas.microsoft.com/office/drawing/2014/main" id="{1B983FA9-8657-D664-FCB3-FF64B41F0E7B}"/>
               </a:ext>
             </a:extLst>
           </p:cNvPr>
@@ -10290,189 +10757,51 @@
           <a:p>
             <a:r>
               <a:rPr lang="en-US" sz="3200" b="1" u="sng" dirty="0"/>
-              <a:t>COMMON IT INCIDENT MANAGEMENT ROLES:</a:t>
+              <a:t>INCIDENT PROCESS:</a:t>
             </a:r>
             <a:endParaRPr lang="en-IN" sz="3200" b="1" u="sng" dirty="0"/>
           </a:p>
         </p:txBody>
       </p:sp>
-      <p:sp>
-        <p:nvSpPr>
-          <p:cNvPr id="3" name="Content Placeholder 2">
+      <p:pic>
+        <p:nvPicPr>
+          <p:cNvPr id="5" name="Content Placeholder 4" descr="A diagram of a company&#10;&#10;Description automatically generated">
             <a:extLst>
               <a:ext uri="{FF2B5EF4-FFF2-40B4-BE49-F238E27FC236}">
-                <a16:creationId xmlns:a16="http://schemas.microsoft.com/office/drawing/2014/main" id="{2F219EE1-2E90-C7F7-0FA4-8311F3021E3C}"/>
+                <a16:creationId xmlns:a16="http://schemas.microsoft.com/office/drawing/2014/main" id="{1C309B9B-C684-AA07-7D1E-86F894B90EBF}"/>
               </a:ext>
             </a:extLst>
           </p:cNvPr>
-          <p:cNvSpPr>
-            <a:spLocks noGrp="1"/>
-          </p:cNvSpPr>
+          <p:cNvPicPr>
+            <a:picLocks noGrp="1" noChangeAspect="1"/>
+          </p:cNvPicPr>
           <p:nvPr>
             <p:ph idx="1"/>
           </p:nvPr>
-        </p:nvSpPr>
+        </p:nvPicPr>
+        <p:blipFill>
+          <a:blip r:embed="rId2">
+            <a:extLst>
+              <a:ext uri="{28A0092B-C50C-407E-A947-70E740481C1C}">
+                <a14:useLocalDpi xmlns:a14="http://schemas.microsoft.com/office/drawing/2010/main" val="0"/>
+              </a:ext>
+            </a:extLst>
+          </a:blip>
+          <a:stretch>
+            <a:fillRect/>
+          </a:stretch>
+        </p:blipFill>
         <p:spPr>
           <a:xfrm>
-            <a:off x="838200" y="1526796"/>
-            <a:ext cx="10515600" cy="4966079"/>
+            <a:off x="692726" y="1825625"/>
+            <a:ext cx="10834255" cy="4898448"/>
           </a:xfrm>
         </p:spPr>
-        <p:txBody>
-          <a:bodyPr>
-            <a:normAutofit fontScale="40000" lnSpcReduction="20000"/>
-          </a:bodyPr>
-          <a:lstStyle/>
-          <a:p>
-            <a:pPr marL="0" indent="0">
-              <a:buNone/>
-            </a:pPr>
-            <a:r>
-              <a:rPr lang="en-US" sz="3700" b="1" u="sng" dirty="0"/>
-              <a:t>End user / user / requester:</a:t>
-            </a:r>
-          </a:p>
-          <a:p>
-            <a:pPr marL="0" indent="0">
-              <a:buNone/>
-            </a:pPr>
-            <a:r>
-              <a:rPr lang="en-US" dirty="0"/>
-              <a:t>This is the stakeholder who usually experiences a disruption in service and raises an incident ticket to initiate the process of incident management.</a:t>
-            </a:r>
-          </a:p>
-          <a:p>
-            <a:pPr marL="0" indent="0">
-              <a:buNone/>
-            </a:pPr>
-            <a:endParaRPr lang="en-US" dirty="0"/>
-          </a:p>
-          <a:p>
-            <a:pPr marL="0" indent="0">
-              <a:buNone/>
-            </a:pPr>
-            <a:r>
-              <a:rPr lang="en-US" sz="3700" b="1" u="sng" dirty="0"/>
-              <a:t>Tier 1 service desk:</a:t>
-            </a:r>
-            <a:endParaRPr lang="en-US" b="1" u="sng" dirty="0"/>
-          </a:p>
-          <a:p>
-            <a:pPr marL="0" indent="0">
-              <a:buNone/>
-            </a:pPr>
-            <a:r>
-              <a:rPr lang="en-US" dirty="0"/>
-              <a:t>This is the first point of contact for the requesters when they want to raise a request or incident ticket. The Tier 1 service desk usually consists of technicians who have a working knowledge of the most common issues that might occur in an IT environment, including password resets and Wi-Fi problems.</a:t>
-            </a:r>
-          </a:p>
-          <a:p>
-            <a:pPr marL="0" indent="0">
-              <a:buNone/>
-            </a:pPr>
-            <a:endParaRPr lang="en-US" dirty="0"/>
-          </a:p>
-          <a:p>
-            <a:pPr marL="0" indent="0">
-              <a:buNone/>
-            </a:pPr>
-            <a:r>
-              <a:rPr lang="en-US" sz="3700" b="1" u="sng" dirty="0"/>
-              <a:t>Tier 2 service desk:</a:t>
-            </a:r>
-            <a:endParaRPr lang="en-US" b="1" u="sng" dirty="0"/>
-          </a:p>
-          <a:p>
-            <a:pPr marL="0" indent="0">
-              <a:buNone/>
-            </a:pPr>
-            <a:r>
-              <a:rPr lang="en-US" dirty="0"/>
-              <a:t>This service desk is made up of technicians with advanced knowledge of incident management. They usually receive more complex requests from end users; they also receive requests in the form of escalations from Tier 1.</a:t>
-            </a:r>
-          </a:p>
-          <a:p>
-            <a:pPr marL="0" indent="0">
-              <a:buNone/>
-            </a:pPr>
-            <a:endParaRPr lang="en-US" dirty="0"/>
-          </a:p>
-          <a:p>
-            <a:pPr marL="0" indent="0">
-              <a:buNone/>
-            </a:pPr>
-            <a:r>
-              <a:rPr lang="en-US" sz="3700" b="1" u="sng" dirty="0"/>
-              <a:t>Tier 3 (and above) service desk:</a:t>
-            </a:r>
-            <a:endParaRPr lang="en-US" b="1" u="sng" dirty="0"/>
-          </a:p>
-          <a:p>
-            <a:pPr marL="0" indent="0">
-              <a:buNone/>
-            </a:pPr>
-            <a:r>
-              <a:rPr lang="en-US" dirty="0"/>
-              <a:t>This level is usually comprised of specialist technicians who have advanced knowledge of particular domains in the IT infrastructure. For example, technicians for hardware maintenance and server support specialize in very specific fields.</a:t>
-            </a:r>
-          </a:p>
-          <a:p>
-            <a:pPr marL="0" indent="0">
-              <a:buNone/>
-            </a:pPr>
-            <a:endParaRPr lang="en-US" dirty="0"/>
-          </a:p>
-          <a:p>
-            <a:pPr marL="0" indent="0">
-              <a:buNone/>
-            </a:pPr>
-            <a:r>
-              <a:rPr lang="en-US" sz="3700" b="1" u="sng" dirty="0"/>
-              <a:t>Incident manager:</a:t>
-            </a:r>
-            <a:endParaRPr lang="en-US" b="1" u="sng" dirty="0"/>
-          </a:p>
-          <a:p>
-            <a:pPr marL="0" indent="0">
-              <a:buNone/>
-            </a:pPr>
-            <a:r>
-              <a:rPr lang="en-US" dirty="0"/>
-              <a:t>This stakeholder plays a key role in the process of incident management by monitoring how effective the process is, recommending improvements, and ensuring the process is followed, among other responsibilities.</a:t>
-            </a:r>
-          </a:p>
-          <a:p>
-            <a:pPr marL="0" indent="0">
-              <a:buNone/>
-            </a:pPr>
-            <a:endParaRPr lang="en-US" dirty="0"/>
-          </a:p>
-          <a:p>
-            <a:pPr marL="0" indent="0">
-              <a:buNone/>
-            </a:pPr>
-            <a:r>
-              <a:rPr lang="en-US" sz="3700" b="1" u="sng" dirty="0"/>
-              <a:t>Process owner:</a:t>
-            </a:r>
-            <a:endParaRPr lang="en-US" b="1" u="sng" dirty="0"/>
-          </a:p>
-          <a:p>
-            <a:pPr marL="0" indent="0">
-              <a:buNone/>
-            </a:pPr>
-            <a:r>
-              <a:rPr lang="en-US" dirty="0"/>
-              <a:t>This stakeholder owns the process followed for managing incidents. They also analyze, modify, and improve the process to ensure it best serves the interest of the organization.</a:t>
-            </a:r>
-            <a:endParaRPr lang="en-IN" dirty="0"/>
-          </a:p>
-        </p:txBody>
-      </p:sp>
+      </p:pic>
     </p:spTree>
     <p:extLst>
       <p:ext uri="{BB962C8B-B14F-4D97-AF65-F5344CB8AC3E}">
-        <p14:creationId xmlns:p14="http://schemas.microsoft.com/office/powerpoint/2010/main" val="965706284"/>
+        <p14:creationId xmlns:p14="http://schemas.microsoft.com/office/powerpoint/2010/main" val="1569063382"/>
       </p:ext>
     </p:extLst>
   </p:cSld>
@@ -10778,12 +11107,11 @@
 </file>
 
 <file path=customXml/item1.xml><?xml version="1.0" encoding="utf-8"?>
-<?mso-contentType ?>
-<FormTemplates xmlns="http://schemas.microsoft.com/sharepoint/v3/contenttype/forms">
-  <Display>DocumentLibraryForm</Display>
-  <Edit>DocumentLibraryForm</Edit>
-  <New>DocumentLibraryForm</New>
-</FormTemplates>
+<p:properties xmlns:p="http://schemas.microsoft.com/office/2006/metadata/properties" xmlns:xsi="http://www.w3.org/2001/XMLSchema-instance" xmlns:pc="http://schemas.microsoft.com/office/infopath/2007/PartnerControls">
+  <documentManagement>
+    <_activity xmlns="46ccd29f-f70d-4609-a317-8968d41a404d" xsi:nil="true"/>
+  </documentManagement>
+</p:properties>
 </file>
 
 <file path=customXml/item2.xml><?xml version="1.0" encoding="utf-8"?>
@@ -11002,17 +11330,27 @@
 </file>
 
 <file path=customXml/item3.xml><?xml version="1.0" encoding="utf-8"?>
-<p:properties xmlns:p="http://schemas.microsoft.com/office/2006/metadata/properties" xmlns:xsi="http://www.w3.org/2001/XMLSchema-instance" xmlns:pc="http://schemas.microsoft.com/office/infopath/2007/PartnerControls">
-  <documentManagement>
-    <_activity xmlns="46ccd29f-f70d-4609-a317-8968d41a404d" xsi:nil="true"/>
-  </documentManagement>
-</p:properties>
+<?mso-contentType ?>
+<FormTemplates xmlns="http://schemas.microsoft.com/sharepoint/v3/contenttype/forms">
+  <Display>DocumentLibraryForm</Display>
+  <Edit>DocumentLibraryForm</Edit>
+  <New>DocumentLibraryForm</New>
+</FormTemplates>
 </file>
 
 <file path=customXml/itemProps1.xml><?xml version="1.0" encoding="utf-8"?>
-<ds:datastoreItem xmlns:ds="http://schemas.openxmlformats.org/officeDocument/2006/customXml" ds:itemID="{BA9CBFD2-4135-4725-BBEC-E27ABA88DCD4}">
+<ds:datastoreItem xmlns:ds="http://schemas.openxmlformats.org/officeDocument/2006/customXml" ds:itemID="{0BE9AD36-30A4-4004-A75D-E267272DE5BC}">
   <ds:schemaRefs>
-    <ds:schemaRef ds:uri="http://schemas.microsoft.com/sharepoint/v3/contenttype/forms"/>
+    <ds:schemaRef ds:uri="http://schemas.microsoft.com/office/2006/documentManagement/types"/>
+    <ds:schemaRef ds:uri="http://schemas.microsoft.com/office/infopath/2007/PartnerControls"/>
+    <ds:schemaRef ds:uri="http://purl.org/dc/elements/1.1/"/>
+    <ds:schemaRef ds:uri="http://schemas.microsoft.com/office/2006/metadata/properties"/>
+    <ds:schemaRef ds:uri="http://purl.org/dc/terms/"/>
+    <ds:schemaRef ds:uri="347dcaf8-0ddc-426e-8eaa-fa982e2d5739"/>
+    <ds:schemaRef ds:uri="http://schemas.openxmlformats.org/package/2006/metadata/core-properties"/>
+    <ds:schemaRef ds:uri="46ccd29f-f70d-4609-a317-8968d41a404d"/>
+    <ds:schemaRef ds:uri="http://www.w3.org/XML/1998/namespace"/>
+    <ds:schemaRef ds:uri="http://purl.org/dc/dcmitype/"/>
   </ds:schemaRefs>
 </ds:datastoreItem>
 </file>
@@ -11037,18 +11375,9 @@
 </file>
 
 <file path=customXml/itemProps3.xml><?xml version="1.0" encoding="utf-8"?>
-<ds:datastoreItem xmlns:ds="http://schemas.openxmlformats.org/officeDocument/2006/customXml" ds:itemID="{0BE9AD36-30A4-4004-A75D-E267272DE5BC}">
+<ds:datastoreItem xmlns:ds="http://schemas.openxmlformats.org/officeDocument/2006/customXml" ds:itemID="{BA9CBFD2-4135-4725-BBEC-E27ABA88DCD4}">
   <ds:schemaRefs>
-    <ds:schemaRef ds:uri="http://schemas.microsoft.com/office/2006/documentManagement/types"/>
-    <ds:schemaRef ds:uri="http://schemas.microsoft.com/office/infopath/2007/PartnerControls"/>
-    <ds:schemaRef ds:uri="http://purl.org/dc/elements/1.1/"/>
-    <ds:schemaRef ds:uri="http://schemas.microsoft.com/office/2006/metadata/properties"/>
-    <ds:schemaRef ds:uri="http://purl.org/dc/terms/"/>
-    <ds:schemaRef ds:uri="347dcaf8-0ddc-426e-8eaa-fa982e2d5739"/>
-    <ds:schemaRef ds:uri="http://schemas.openxmlformats.org/package/2006/metadata/core-properties"/>
-    <ds:schemaRef ds:uri="46ccd29f-f70d-4609-a317-8968d41a404d"/>
-    <ds:schemaRef ds:uri="http://www.w3.org/XML/1998/namespace"/>
-    <ds:schemaRef ds:uri="http://purl.org/dc/dcmitype/"/>
+    <ds:schemaRef ds:uri="http://schemas.microsoft.com/sharepoint/v3/contenttype/forms"/>
   </ds:schemaRefs>
 </ds:datastoreItem>
 </file>
</xml_diff>